<commit_message>
Se realizan cambios a la presentación y se agrega link para el video en youtube
</commit_message>
<xml_diff>
--- a/ArquitecturaPïngPong.pptx
+++ b/ArquitecturaPïngPong.pptx
@@ -5,14 +5,16 @@
     <p:sldMasterId id="2147483714" r:id="rId1"/>
   </p:sldMasterIdLst>
   <p:sldIdLst>
-    <p:sldId id="256" r:id="rId2"/>
-    <p:sldId id="263" r:id="rId3"/>
-    <p:sldId id="257" r:id="rId4"/>
-    <p:sldId id="258" r:id="rId5"/>
-    <p:sldId id="259" r:id="rId6"/>
-    <p:sldId id="260" r:id="rId7"/>
-    <p:sldId id="261" r:id="rId8"/>
-    <p:sldId id="262" r:id="rId9"/>
+    <p:sldId id="266" r:id="rId2"/>
+    <p:sldId id="267" r:id="rId3"/>
+    <p:sldId id="265" r:id="rId4"/>
+    <p:sldId id="263" r:id="rId5"/>
+    <p:sldId id="257" r:id="rId6"/>
+    <p:sldId id="258" r:id="rId7"/>
+    <p:sldId id="259" r:id="rId8"/>
+    <p:sldId id="260" r:id="rId9"/>
+    <p:sldId id="261" r:id="rId10"/>
+    <p:sldId id="262" r:id="rId11"/>
   </p:sldIdLst>
   <p:sldSz cx="12192000" cy="6858000"/>
   <p:notesSz cx="6858000" cy="9144000"/>
@@ -111,6 +113,11 @@
       </a:defRPr>
     </a:lvl9pPr>
   </p:defaultTextStyle>
+  <p:extLst>
+    <p:ext uri="{EFAFB233-063F-42B5-8137-9DF3F51BA10A}">
+      <p15:sldGuideLst xmlns:p15="http://schemas.microsoft.com/office/powerpoint/2012/main"/>
+    </p:ext>
+  </p:extLst>
 </p:presentation>
 </file>
 
@@ -340,7 +347,7 @@
           <a:p>
             <a:fld id="{526E6CDF-BCE4-4390-9EA5-13A682DE4C4A}" type="datetimeFigureOut">
               <a:rPr lang="es-CO" smtClean="0"/>
-              <a:t>26/02/2018</a:t>
+              <a:t>1/03/2018</a:t>
             </a:fld>
             <a:endParaRPr lang="es-CO"/>
           </a:p>
@@ -548,7 +555,7 @@
           <a:p>
             <a:fld id="{526E6CDF-BCE4-4390-9EA5-13A682DE4C4A}" type="datetimeFigureOut">
               <a:rPr lang="es-CO" smtClean="0"/>
-              <a:t>26/02/2018</a:t>
+              <a:t>1/03/2018</a:t>
             </a:fld>
             <a:endParaRPr lang="es-CO"/>
           </a:p>
@@ -804,7 +811,7 @@
           <a:p>
             <a:fld id="{526E6CDF-BCE4-4390-9EA5-13A682DE4C4A}" type="datetimeFigureOut">
               <a:rPr lang="es-CO" smtClean="0"/>
-              <a:t>26/02/2018</a:t>
+              <a:t>1/03/2018</a:t>
             </a:fld>
             <a:endParaRPr lang="es-CO"/>
           </a:p>
@@ -978,7 +985,7 @@
           <a:p>
             <a:fld id="{526E6CDF-BCE4-4390-9EA5-13A682DE4C4A}" type="datetimeFigureOut">
               <a:rPr lang="es-CO" smtClean="0"/>
-              <a:t>26/02/2018</a:t>
+              <a:t>1/03/2018</a:t>
             </a:fld>
             <a:endParaRPr lang="es-CO"/>
           </a:p>
@@ -1321,7 +1328,7 @@
           <a:p>
             <a:fld id="{526E6CDF-BCE4-4390-9EA5-13A682DE4C4A}" type="datetimeFigureOut">
               <a:rPr lang="es-CO" smtClean="0"/>
-              <a:t>26/02/2018</a:t>
+              <a:t>1/03/2018</a:t>
             </a:fld>
             <a:endParaRPr lang="es-CO"/>
           </a:p>
@@ -1596,7 +1603,7 @@
           <a:p>
             <a:fld id="{526E6CDF-BCE4-4390-9EA5-13A682DE4C4A}" type="datetimeFigureOut">
               <a:rPr lang="es-CO" smtClean="0"/>
-              <a:t>26/02/2018</a:t>
+              <a:t>1/03/2018</a:t>
             </a:fld>
             <a:endParaRPr lang="es-CO"/>
           </a:p>
@@ -1975,7 +1982,7 @@
           <a:p>
             <a:fld id="{526E6CDF-BCE4-4390-9EA5-13A682DE4C4A}" type="datetimeFigureOut">
               <a:rPr lang="es-CO" smtClean="0"/>
-              <a:t>26/02/2018</a:t>
+              <a:t>1/03/2018</a:t>
             </a:fld>
             <a:endParaRPr lang="es-CO"/>
           </a:p>
@@ -2093,7 +2100,7 @@
           <a:p>
             <a:fld id="{526E6CDF-BCE4-4390-9EA5-13A682DE4C4A}" type="datetimeFigureOut">
               <a:rPr lang="es-CO" smtClean="0"/>
-              <a:t>26/02/2018</a:t>
+              <a:t>1/03/2018</a:t>
             </a:fld>
             <a:endParaRPr lang="es-CO"/>
           </a:p>
@@ -2264,7 +2271,7 @@
           <a:p>
             <a:fld id="{526E6CDF-BCE4-4390-9EA5-13A682DE4C4A}" type="datetimeFigureOut">
               <a:rPr lang="es-CO" smtClean="0"/>
-              <a:t>26/02/2018</a:t>
+              <a:t>1/03/2018</a:t>
             </a:fld>
             <a:endParaRPr lang="es-CO"/>
           </a:p>
@@ -2618,7 +2625,7 @@
           <a:p>
             <a:fld id="{526E6CDF-BCE4-4390-9EA5-13A682DE4C4A}" type="datetimeFigureOut">
               <a:rPr lang="es-CO" smtClean="0"/>
-              <a:t>26/02/2018</a:t>
+              <a:t>1/03/2018</a:t>
             </a:fld>
             <a:endParaRPr lang="es-CO"/>
           </a:p>
@@ -3000,7 +3007,7 @@
           <a:p>
             <a:fld id="{526E6CDF-BCE4-4390-9EA5-13A682DE4C4A}" type="datetimeFigureOut">
               <a:rPr lang="es-CO" smtClean="0"/>
-              <a:t>26/02/2018</a:t>
+              <a:t>1/03/2018</a:t>
             </a:fld>
             <a:endParaRPr lang="es-CO"/>
           </a:p>
@@ -3287,7 +3294,7 @@
           <a:p>
             <a:fld id="{526E6CDF-BCE4-4390-9EA5-13A682DE4C4A}" type="datetimeFigureOut">
               <a:rPr lang="es-CO" smtClean="0"/>
-              <a:t>26/02/2018</a:t>
+              <a:t>1/03/2018</a:t>
             </a:fld>
             <a:endParaRPr lang="es-CO"/>
           </a:p>
@@ -3811,68 +3818,62 @@
           <a:chExt cx="0" cy="0"/>
         </a:xfrm>
       </p:grpSpPr>
-      <p:pic>
-        <p:nvPicPr>
-          <p:cNvPr id="9" name="Imagen 8">
+      <p:sp>
+        <p:nvSpPr>
+          <p:cNvPr id="3" name="Marcador de contenido 2">
             <a:extLst>
               <a:ext uri="{FF2B5EF4-FFF2-40B4-BE49-F238E27FC236}">
-                <a16:creationId xmlns:a16="http://schemas.microsoft.com/office/drawing/2014/main" id="{B0851EA8-CC8B-47EF-9F04-A0946FFA1C44}"/>
+                <a16:creationId xmlns:a16="http://schemas.microsoft.com/office/drawing/2014/main" id="{FEE43226-406A-4B54-B11A-636AB50DAA8E}"/>
               </a:ext>
             </a:extLst>
           </p:cNvPr>
-          <p:cNvPicPr>
-            <a:picLocks noChangeAspect="1"/>
-          </p:cNvPicPr>
-          <p:nvPr/>
-        </p:nvPicPr>
-        <p:blipFill>
-          <a:blip r:embed="rId2">
-            <a:extLst>
-              <a:ext uri="{28A0092B-C50C-407E-A947-70E740481C1C}">
-                <a14:useLocalDpi xmlns:a14="http://schemas.microsoft.com/office/drawing/2010/main" val="0"/>
-              </a:ext>
-            </a:extLst>
-          </a:blip>
-          <a:stretch>
-            <a:fillRect/>
-          </a:stretch>
-        </p:blipFill>
-        <p:spPr>
-          <a:xfrm>
-            <a:off x="423071" y="590843"/>
-            <a:ext cx="11345858" cy="5219114"/>
-          </a:xfrm>
-          <a:prstGeom prst="rect">
-            <a:avLst/>
-          </a:prstGeom>
-        </p:spPr>
-      </p:pic>
+          <p:cNvSpPr>
+            <a:spLocks noGrp="1"/>
+          </p:cNvSpPr>
+          <p:nvPr>
+            <p:ph idx="1"/>
+          </p:nvPr>
+        </p:nvSpPr>
+        <p:spPr/>
+        <p:txBody>
+          <a:bodyPr>
+            <a:normAutofit/>
+          </a:bodyPr>
+          <a:lstStyle/>
+          <a:p>
+            <a:pPr algn="ctr"/>
+            <a:r>
+              <a:rPr lang="es-CO" sz="6000" dirty="0"/>
+              <a:t>MESSAGE DRIVEN DESING</a:t>
+            </a:r>
+          </a:p>
+          <a:p>
+            <a:pPr algn="ctr"/>
+            <a:endParaRPr lang="es-CO" sz="6000" dirty="0"/>
+          </a:p>
+          <a:p>
+            <a:pPr algn="ctr"/>
+            <a:r>
+              <a:rPr lang="es-CO" dirty="0"/>
+              <a:t>Roberto Alejandro Restrepo Rivera</a:t>
+            </a:r>
+          </a:p>
+        </p:txBody>
+      </p:sp>
     </p:spTree>
     <p:extLst>
       <p:ext uri="{BB962C8B-B14F-4D97-AF65-F5344CB8AC3E}">
-        <p14:creationId xmlns:p14="http://schemas.microsoft.com/office/powerpoint/2010/main" val="166511699"/>
+        <p14:creationId xmlns:p14="http://schemas.microsoft.com/office/powerpoint/2010/main" val="2567853055"/>
       </p:ext>
     </p:extLst>
   </p:cSld>
   <p:clrMapOvr>
     <a:masterClrMapping/>
   </p:clrMapOvr>
-  <mc:AlternateContent xmlns:mc="http://schemas.openxmlformats.org/markup-compatibility/2006">
-    <mc:Choice xmlns:p159="http://schemas.microsoft.com/office/powerpoint/2015/09/main" Requires="p159">
-      <p:transition xmlns:p14="http://schemas.microsoft.com/office/powerpoint/2010/main" spd="slow" p14:dur="2000">
-        <p159:morph option="byObject"/>
-      </p:transition>
-    </mc:Choice>
-    <mc:Fallback>
-      <p:transition spd="slow">
-        <p:fade/>
-      </p:transition>
-    </mc:Fallback>
-  </mc:AlternateContent>
 </p:sld>
 </file>
 
-<file path=ppt/slides/slide2.xml><?xml version="1.0" encoding="utf-8"?>
+<file path=ppt/slides/slide10.xml><?xml version="1.0" encoding="utf-8"?>
 <p:sld xmlns:a="http://schemas.openxmlformats.org/drawingml/2006/main" xmlns:r="http://schemas.openxmlformats.org/officeDocument/2006/relationships" xmlns:p="http://schemas.openxmlformats.org/presentationml/2006/main">
   <p:cSld>
     <p:spTree>
@@ -3964,28 +3965,344 @@
           </a:fontRef>
         </p:style>
       </p:cxnSp>
+      <p:cxnSp>
+        <p:nvCxnSpPr>
+          <p:cNvPr id="3" name="Conector recto de flecha 2">
+            <a:extLst>
+              <a:ext uri="{FF2B5EF4-FFF2-40B4-BE49-F238E27FC236}">
+                <a16:creationId xmlns:a16="http://schemas.microsoft.com/office/drawing/2014/main" id="{E7DD0955-C0F0-4FF3-8B21-C4522B09365F}"/>
+              </a:ext>
+            </a:extLst>
+          </p:cNvPr>
+          <p:cNvCxnSpPr>
+            <a:cxnSpLocks/>
+          </p:cNvCxnSpPr>
+          <p:nvPr/>
+        </p:nvCxnSpPr>
+        <p:spPr>
+          <a:xfrm flipV="1">
+            <a:off x="3713871" y="2293035"/>
+            <a:ext cx="731520" cy="689316"/>
+          </a:xfrm>
+          <a:prstGeom prst="straightConnector1">
+            <a:avLst/>
+          </a:prstGeom>
+          <a:ln w="76200">
+            <a:tailEnd type="triangle"/>
+          </a:ln>
+        </p:spPr>
+        <p:style>
+          <a:lnRef idx="1">
+            <a:schemeClr val="accent1"/>
+          </a:lnRef>
+          <a:fillRef idx="0">
+            <a:schemeClr val="accent1"/>
+          </a:fillRef>
+          <a:effectRef idx="0">
+            <a:schemeClr val="accent1"/>
+          </a:effectRef>
+          <a:fontRef idx="minor">
+            <a:schemeClr val="tx1"/>
+          </a:fontRef>
+        </p:style>
+      </p:cxnSp>
+      <p:cxnSp>
+        <p:nvCxnSpPr>
+          <p:cNvPr id="4" name="Conector recto de flecha 3">
+            <a:extLst>
+              <a:ext uri="{FF2B5EF4-FFF2-40B4-BE49-F238E27FC236}">
+                <a16:creationId xmlns:a16="http://schemas.microsoft.com/office/drawing/2014/main" id="{B065E748-CB10-496D-A67C-CCAB310768B2}"/>
+              </a:ext>
+            </a:extLst>
+          </p:cNvPr>
+          <p:cNvCxnSpPr>
+            <a:cxnSpLocks/>
+          </p:cNvCxnSpPr>
+          <p:nvPr/>
+        </p:nvCxnSpPr>
+        <p:spPr>
+          <a:xfrm>
+            <a:off x="5983459" y="2152357"/>
+            <a:ext cx="1162929" cy="0"/>
+          </a:xfrm>
+          <a:prstGeom prst="straightConnector1">
+            <a:avLst/>
+          </a:prstGeom>
+          <a:ln w="76200">
+            <a:tailEnd type="triangle"/>
+          </a:ln>
+        </p:spPr>
+        <p:style>
+          <a:lnRef idx="1">
+            <a:schemeClr val="accent1"/>
+          </a:lnRef>
+          <a:fillRef idx="0">
+            <a:schemeClr val="accent1"/>
+          </a:fillRef>
+          <a:effectRef idx="0">
+            <a:schemeClr val="accent1"/>
+          </a:effectRef>
+          <a:fontRef idx="minor">
+            <a:schemeClr val="tx1"/>
+          </a:fontRef>
+        </p:style>
+      </p:cxnSp>
+      <p:cxnSp>
+        <p:nvCxnSpPr>
+          <p:cNvPr id="5" name="Conector recto de flecha 4">
+            <a:extLst>
+              <a:ext uri="{FF2B5EF4-FFF2-40B4-BE49-F238E27FC236}">
+                <a16:creationId xmlns:a16="http://schemas.microsoft.com/office/drawing/2014/main" id="{5D4892AA-3836-4249-9055-D6E974209EB0}"/>
+              </a:ext>
+            </a:extLst>
+          </p:cNvPr>
+          <p:cNvCxnSpPr/>
+          <p:nvPr/>
+        </p:nvCxnSpPr>
+        <p:spPr>
+          <a:xfrm>
+            <a:off x="8834511" y="2152357"/>
+            <a:ext cx="1491175" cy="534572"/>
+          </a:xfrm>
+          <a:prstGeom prst="straightConnector1">
+            <a:avLst/>
+          </a:prstGeom>
+          <a:ln w="76200">
+            <a:solidFill>
+              <a:schemeClr val="accent1"/>
+            </a:solidFill>
+            <a:tailEnd type="triangle"/>
+          </a:ln>
+        </p:spPr>
+        <p:style>
+          <a:lnRef idx="1">
+            <a:schemeClr val="accent1"/>
+          </a:lnRef>
+          <a:fillRef idx="0">
+            <a:schemeClr val="accent1"/>
+          </a:fillRef>
+          <a:effectRef idx="0">
+            <a:schemeClr val="accent1"/>
+          </a:effectRef>
+          <a:fontRef idx="minor">
+            <a:schemeClr val="tx1"/>
+          </a:fontRef>
+        </p:style>
+      </p:cxnSp>
+      <p:cxnSp>
+        <p:nvCxnSpPr>
+          <p:cNvPr id="6" name="Conector recto de flecha 5">
+            <a:extLst>
+              <a:ext uri="{FF2B5EF4-FFF2-40B4-BE49-F238E27FC236}">
+                <a16:creationId xmlns:a16="http://schemas.microsoft.com/office/drawing/2014/main" id="{192563FE-6254-4095-AAE0-5269C3C8870F}"/>
+              </a:ext>
+            </a:extLst>
+          </p:cNvPr>
+          <p:cNvCxnSpPr/>
+          <p:nvPr/>
+        </p:nvCxnSpPr>
+        <p:spPr>
+          <a:xfrm flipH="1">
+            <a:off x="8834511" y="3784209"/>
+            <a:ext cx="1589649" cy="379828"/>
+          </a:xfrm>
+          <a:prstGeom prst="straightConnector1">
+            <a:avLst/>
+          </a:prstGeom>
+          <a:ln w="76200">
+            <a:solidFill>
+              <a:schemeClr val="accent1"/>
+            </a:solidFill>
+            <a:tailEnd type="triangle"/>
+          </a:ln>
+        </p:spPr>
+        <p:style>
+          <a:lnRef idx="1">
+            <a:schemeClr val="accent1"/>
+          </a:lnRef>
+          <a:fillRef idx="0">
+            <a:schemeClr val="accent1"/>
+          </a:fillRef>
+          <a:effectRef idx="0">
+            <a:schemeClr val="accent1"/>
+          </a:effectRef>
+          <a:fontRef idx="minor">
+            <a:schemeClr val="tx1"/>
+          </a:fontRef>
+        </p:style>
+      </p:cxnSp>
+      <p:cxnSp>
+        <p:nvCxnSpPr>
+          <p:cNvPr id="7" name="Conector recto de flecha 6">
+            <a:extLst>
+              <a:ext uri="{FF2B5EF4-FFF2-40B4-BE49-F238E27FC236}">
+                <a16:creationId xmlns:a16="http://schemas.microsoft.com/office/drawing/2014/main" id="{B3D05A8C-E8AB-4616-92CB-6A05350CAA14}"/>
+              </a:ext>
+            </a:extLst>
+          </p:cNvPr>
+          <p:cNvCxnSpPr>
+            <a:cxnSpLocks/>
+          </p:cNvCxnSpPr>
+          <p:nvPr/>
+        </p:nvCxnSpPr>
+        <p:spPr>
+          <a:xfrm flipH="1">
+            <a:off x="5641146" y="4164037"/>
+            <a:ext cx="1505242" cy="0"/>
+          </a:xfrm>
+          <a:prstGeom prst="straightConnector1">
+            <a:avLst/>
+          </a:prstGeom>
+          <a:ln w="76200">
+            <a:solidFill>
+              <a:schemeClr val="accent1"/>
+            </a:solidFill>
+            <a:tailEnd type="triangle"/>
+          </a:ln>
+        </p:spPr>
+        <p:style>
+          <a:lnRef idx="1">
+            <a:schemeClr val="accent1"/>
+          </a:lnRef>
+          <a:fillRef idx="0">
+            <a:schemeClr val="accent1"/>
+          </a:fillRef>
+          <a:effectRef idx="0">
+            <a:schemeClr val="accent1"/>
+          </a:effectRef>
+          <a:fontRef idx="minor">
+            <a:schemeClr val="tx1"/>
+          </a:fontRef>
+        </p:style>
+      </p:cxnSp>
+      <p:cxnSp>
+        <p:nvCxnSpPr>
+          <p:cNvPr id="8" name="Conector recto de flecha 7">
+            <a:extLst>
+              <a:ext uri="{FF2B5EF4-FFF2-40B4-BE49-F238E27FC236}">
+                <a16:creationId xmlns:a16="http://schemas.microsoft.com/office/drawing/2014/main" id="{12B08431-548A-4358-8862-5139E8177FCF}"/>
+              </a:ext>
+            </a:extLst>
+          </p:cNvPr>
+          <p:cNvCxnSpPr>
+            <a:cxnSpLocks/>
+          </p:cNvCxnSpPr>
+          <p:nvPr/>
+        </p:nvCxnSpPr>
+        <p:spPr>
+          <a:xfrm flipH="1" flipV="1">
+            <a:off x="3601329" y="3429000"/>
+            <a:ext cx="844062" cy="931985"/>
+          </a:xfrm>
+          <a:prstGeom prst="straightConnector1">
+            <a:avLst/>
+          </a:prstGeom>
+          <a:ln w="76200">
+            <a:tailEnd type="triangle"/>
+          </a:ln>
+        </p:spPr>
+        <p:style>
+          <a:lnRef idx="1">
+            <a:schemeClr val="accent1"/>
+          </a:lnRef>
+          <a:fillRef idx="0">
+            <a:schemeClr val="accent1"/>
+          </a:fillRef>
+          <a:effectRef idx="0">
+            <a:schemeClr val="accent1"/>
+          </a:effectRef>
+          <a:fontRef idx="minor">
+            <a:schemeClr val="tx1"/>
+          </a:fontRef>
+        </p:style>
+      </p:cxnSp>
     </p:spTree>
     <p:extLst>
       <p:ext uri="{BB962C8B-B14F-4D97-AF65-F5344CB8AC3E}">
-        <p14:creationId xmlns:p14="http://schemas.microsoft.com/office/powerpoint/2010/main" val="3238135941"/>
+        <p14:creationId xmlns:p14="http://schemas.microsoft.com/office/powerpoint/2010/main" val="3162310616"/>
       </p:ext>
     </p:extLst>
   </p:cSld>
   <p:clrMapOvr>
     <a:masterClrMapping/>
   </p:clrMapOvr>
-  <mc:AlternateContent xmlns:mc="http://schemas.openxmlformats.org/markup-compatibility/2006">
-    <mc:Choice xmlns:p159="http://schemas.microsoft.com/office/powerpoint/2015/09/main" Requires="p159">
+  <mc:AlternateContent xmlns:mc="http://schemas.openxmlformats.org/markup-compatibility/2006" xmlns:p159="http://schemas.microsoft.com/office/powerpoint/2015/09/main">
+    <mc:Choice Requires="p159">
       <p:transition xmlns:p14="http://schemas.microsoft.com/office/powerpoint/2010/main" spd="slow" p14:dur="2000">
         <p159:morph option="byObject"/>
       </p:transition>
     </mc:Choice>
-    <mc:Fallback>
+    <mc:Fallback xmlns="">
       <p:transition spd="slow">
         <p:fade/>
       </p:transition>
     </mc:Fallback>
   </mc:AlternateContent>
+</p:sld>
+</file>
+
+<file path=ppt/slides/slide2.xml><?xml version="1.0" encoding="utf-8"?>
+<p:sld xmlns:a="http://schemas.openxmlformats.org/drawingml/2006/main" xmlns:r="http://schemas.openxmlformats.org/officeDocument/2006/relationships" xmlns:p="http://schemas.openxmlformats.org/presentationml/2006/main">
+  <p:cSld>
+    <p:spTree>
+      <p:nvGrpSpPr>
+        <p:cNvPr id="1" name=""/>
+        <p:cNvGrpSpPr/>
+        <p:nvPr/>
+      </p:nvGrpSpPr>
+      <p:grpSpPr>
+        <a:xfrm>
+          <a:off x="0" y="0"/>
+          <a:ext cx="0" cy="0"/>
+          <a:chOff x="0" y="0"/>
+          <a:chExt cx="0" cy="0"/>
+        </a:xfrm>
+      </p:grpSpPr>
+      <p:pic>
+        <p:nvPicPr>
+          <p:cNvPr id="5" name="Marcador de contenido 4">
+            <a:extLst>
+              <a:ext uri="{FF2B5EF4-FFF2-40B4-BE49-F238E27FC236}">
+                <a16:creationId xmlns:a16="http://schemas.microsoft.com/office/drawing/2014/main" id="{D4258F66-1060-4CC5-BEBF-F851C5EE4619}"/>
+              </a:ext>
+            </a:extLst>
+          </p:cNvPr>
+          <p:cNvPicPr>
+            <a:picLocks noGrp="1" noChangeAspect="1"/>
+          </p:cNvPicPr>
+          <p:nvPr>
+            <p:ph idx="1"/>
+          </p:nvPr>
+        </p:nvPicPr>
+        <p:blipFill>
+          <a:blip r:embed="rId2">
+            <a:extLst>
+              <a:ext uri="{28A0092B-C50C-407E-A947-70E740481C1C}">
+                <a14:useLocalDpi xmlns:a14="http://schemas.microsoft.com/office/drawing/2010/main" val="0"/>
+              </a:ext>
+            </a:extLst>
+          </a:blip>
+          <a:stretch>
+            <a:fillRect/>
+          </a:stretch>
+        </p:blipFill>
+        <p:spPr>
+          <a:xfrm>
+            <a:off x="1096963" y="2287587"/>
+            <a:ext cx="10058400" cy="3140077"/>
+          </a:xfrm>
+        </p:spPr>
+      </p:pic>
+    </p:spTree>
+    <p:extLst>
+      <p:ext uri="{BB962C8B-B14F-4D97-AF65-F5344CB8AC3E}">
+        <p14:creationId xmlns:p14="http://schemas.microsoft.com/office/powerpoint/2010/main" val="958116567"/>
+      </p:ext>
+    </p:extLst>
+  </p:cSld>
+  <p:clrMapOvr>
+    <a:masterClrMapping/>
+  </p:clrMapOvr>
 </p:sld>
 </file>
 
@@ -4042,103 +4359,23 @@
           </a:prstGeom>
         </p:spPr>
       </p:pic>
-      <p:cxnSp>
-        <p:nvCxnSpPr>
-          <p:cNvPr id="14" name="Conector recto de flecha 13">
-            <a:extLst>
-              <a:ext uri="{FF2B5EF4-FFF2-40B4-BE49-F238E27FC236}">
-                <a16:creationId xmlns:a16="http://schemas.microsoft.com/office/drawing/2014/main" id="{5383F0A6-A0AA-4884-BB31-E8231E877D66}"/>
-              </a:ext>
-            </a:extLst>
-          </p:cNvPr>
-          <p:cNvCxnSpPr/>
-          <p:nvPr/>
-        </p:nvCxnSpPr>
-        <p:spPr>
-          <a:xfrm>
-            <a:off x="1688123" y="2982351"/>
-            <a:ext cx="787791" cy="0"/>
-          </a:xfrm>
-          <a:prstGeom prst="straightConnector1">
-            <a:avLst/>
-          </a:prstGeom>
-          <a:ln w="76200">
-            <a:tailEnd type="triangle"/>
-          </a:ln>
-        </p:spPr>
-        <p:style>
-          <a:lnRef idx="1">
-            <a:schemeClr val="accent1"/>
-          </a:lnRef>
-          <a:fillRef idx="0">
-            <a:schemeClr val="accent1"/>
-          </a:fillRef>
-          <a:effectRef idx="0">
-            <a:schemeClr val="accent1"/>
-          </a:effectRef>
-          <a:fontRef idx="minor">
-            <a:schemeClr val="tx1"/>
-          </a:fontRef>
-        </p:style>
-      </p:cxnSp>
-      <p:cxnSp>
-        <p:nvCxnSpPr>
-          <p:cNvPr id="3" name="Conector recto de flecha 2">
-            <a:extLst>
-              <a:ext uri="{FF2B5EF4-FFF2-40B4-BE49-F238E27FC236}">
-                <a16:creationId xmlns:a16="http://schemas.microsoft.com/office/drawing/2014/main" id="{E7DD0955-C0F0-4FF3-8B21-C4522B09365F}"/>
-              </a:ext>
-            </a:extLst>
-          </p:cNvPr>
-          <p:cNvCxnSpPr>
-            <a:cxnSpLocks/>
-          </p:cNvCxnSpPr>
-          <p:nvPr/>
-        </p:nvCxnSpPr>
-        <p:spPr>
-          <a:xfrm flipV="1">
-            <a:off x="3713871" y="2293035"/>
-            <a:ext cx="731520" cy="689316"/>
-          </a:xfrm>
-          <a:prstGeom prst="straightConnector1">
-            <a:avLst/>
-          </a:prstGeom>
-          <a:ln w="76200">
-            <a:tailEnd type="triangle"/>
-          </a:ln>
-        </p:spPr>
-        <p:style>
-          <a:lnRef idx="1">
-            <a:schemeClr val="accent1"/>
-          </a:lnRef>
-          <a:fillRef idx="0">
-            <a:schemeClr val="accent1"/>
-          </a:fillRef>
-          <a:effectRef idx="0">
-            <a:schemeClr val="accent1"/>
-          </a:effectRef>
-          <a:fontRef idx="minor">
-            <a:schemeClr val="tx1"/>
-          </a:fontRef>
-        </p:style>
-      </p:cxnSp>
     </p:spTree>
     <p:extLst>
       <p:ext uri="{BB962C8B-B14F-4D97-AF65-F5344CB8AC3E}">
-        <p14:creationId xmlns:p14="http://schemas.microsoft.com/office/powerpoint/2010/main" val="2565349215"/>
+        <p14:creationId xmlns:p14="http://schemas.microsoft.com/office/powerpoint/2010/main" val="2695262047"/>
       </p:ext>
     </p:extLst>
   </p:cSld>
   <p:clrMapOvr>
     <a:masterClrMapping/>
   </p:clrMapOvr>
-  <mc:AlternateContent xmlns:mc="http://schemas.openxmlformats.org/markup-compatibility/2006">
-    <mc:Choice xmlns:p159="http://schemas.microsoft.com/office/powerpoint/2015/09/main" Requires="p159">
+  <mc:AlternateContent xmlns:mc="http://schemas.openxmlformats.org/markup-compatibility/2006" xmlns:p159="http://schemas.microsoft.com/office/powerpoint/2015/09/main">
+    <mc:Choice Requires="p159">
       <p:transition xmlns:p14="http://schemas.microsoft.com/office/powerpoint/2010/main" spd="slow" p14:dur="2000">
         <p159:morph option="byObject"/>
       </p:transition>
     </mc:Choice>
-    <mc:Fallback>
+    <mc:Fallback xmlns="">
       <p:transition spd="slow">
         <p:fade/>
       </p:transition>
@@ -4239,105 +4476,23 @@
           </a:fontRef>
         </p:style>
       </p:cxnSp>
-      <p:cxnSp>
-        <p:nvCxnSpPr>
-          <p:cNvPr id="3" name="Conector recto de flecha 2">
-            <a:extLst>
-              <a:ext uri="{FF2B5EF4-FFF2-40B4-BE49-F238E27FC236}">
-                <a16:creationId xmlns:a16="http://schemas.microsoft.com/office/drawing/2014/main" id="{E7DD0955-C0F0-4FF3-8B21-C4522B09365F}"/>
-              </a:ext>
-            </a:extLst>
-          </p:cNvPr>
-          <p:cNvCxnSpPr>
-            <a:cxnSpLocks/>
-          </p:cNvCxnSpPr>
-          <p:nvPr/>
-        </p:nvCxnSpPr>
-        <p:spPr>
-          <a:xfrm flipV="1">
-            <a:off x="3713871" y="2293035"/>
-            <a:ext cx="731520" cy="689316"/>
-          </a:xfrm>
-          <a:prstGeom prst="straightConnector1">
-            <a:avLst/>
-          </a:prstGeom>
-          <a:ln w="76200">
-            <a:tailEnd type="triangle"/>
-          </a:ln>
-        </p:spPr>
-        <p:style>
-          <a:lnRef idx="1">
-            <a:schemeClr val="accent1"/>
-          </a:lnRef>
-          <a:fillRef idx="0">
-            <a:schemeClr val="accent1"/>
-          </a:fillRef>
-          <a:effectRef idx="0">
-            <a:schemeClr val="accent1"/>
-          </a:effectRef>
-          <a:fontRef idx="minor">
-            <a:schemeClr val="tx1"/>
-          </a:fontRef>
-        </p:style>
-      </p:cxnSp>
-      <p:cxnSp>
-        <p:nvCxnSpPr>
-          <p:cNvPr id="4" name="Conector recto de flecha 3">
-            <a:extLst>
-              <a:ext uri="{FF2B5EF4-FFF2-40B4-BE49-F238E27FC236}">
-                <a16:creationId xmlns:a16="http://schemas.microsoft.com/office/drawing/2014/main" id="{B065E748-CB10-496D-A67C-CCAB310768B2}"/>
-              </a:ext>
-            </a:extLst>
-          </p:cNvPr>
-          <p:cNvCxnSpPr>
-            <a:cxnSpLocks/>
-          </p:cNvCxnSpPr>
-          <p:nvPr/>
-        </p:nvCxnSpPr>
-        <p:spPr>
-          <a:xfrm>
-            <a:off x="5983459" y="2152357"/>
-            <a:ext cx="1162929" cy="0"/>
-          </a:xfrm>
-          <a:prstGeom prst="straightConnector1">
-            <a:avLst/>
-          </a:prstGeom>
-          <a:ln w="76200">
-            <a:tailEnd type="triangle"/>
-          </a:ln>
-        </p:spPr>
-        <p:style>
-          <a:lnRef idx="1">
-            <a:schemeClr val="accent1"/>
-          </a:lnRef>
-          <a:fillRef idx="0">
-            <a:schemeClr val="accent1"/>
-          </a:fillRef>
-          <a:effectRef idx="0">
-            <a:schemeClr val="accent1"/>
-          </a:effectRef>
-          <a:fontRef idx="minor">
-            <a:schemeClr val="tx1"/>
-          </a:fontRef>
-        </p:style>
-      </p:cxnSp>
     </p:spTree>
     <p:extLst>
       <p:ext uri="{BB962C8B-B14F-4D97-AF65-F5344CB8AC3E}">
-        <p14:creationId xmlns:p14="http://schemas.microsoft.com/office/powerpoint/2010/main" val="29913882"/>
+        <p14:creationId xmlns:p14="http://schemas.microsoft.com/office/powerpoint/2010/main" val="3238135941"/>
       </p:ext>
     </p:extLst>
   </p:cSld>
   <p:clrMapOvr>
     <a:masterClrMapping/>
   </p:clrMapOvr>
-  <mc:AlternateContent xmlns:mc="http://schemas.openxmlformats.org/markup-compatibility/2006">
-    <mc:Choice xmlns:p159="http://schemas.microsoft.com/office/powerpoint/2015/09/main" Requires="p159">
+  <mc:AlternateContent xmlns:mc="http://schemas.openxmlformats.org/markup-compatibility/2006" xmlns:p159="http://schemas.microsoft.com/office/powerpoint/2015/09/main">
+    <mc:Choice Requires="p159">
       <p:transition xmlns:p14="http://schemas.microsoft.com/office/powerpoint/2010/main" spd="slow" p14:dur="2000">
         <p159:morph option="byObject"/>
       </p:transition>
     </mc:Choice>
-    <mc:Fallback>
+    <mc:Fallback xmlns="">
       <p:transition spd="slow">
         <p:fade/>
       </p:transition>
@@ -4479,106 +4634,23 @@
           </a:fontRef>
         </p:style>
       </p:cxnSp>
-      <p:cxnSp>
-        <p:nvCxnSpPr>
-          <p:cNvPr id="4" name="Conector recto de flecha 3">
-            <a:extLst>
-              <a:ext uri="{FF2B5EF4-FFF2-40B4-BE49-F238E27FC236}">
-                <a16:creationId xmlns:a16="http://schemas.microsoft.com/office/drawing/2014/main" id="{B065E748-CB10-496D-A67C-CCAB310768B2}"/>
-              </a:ext>
-            </a:extLst>
-          </p:cNvPr>
-          <p:cNvCxnSpPr>
-            <a:cxnSpLocks/>
-          </p:cNvCxnSpPr>
-          <p:nvPr/>
-        </p:nvCxnSpPr>
-        <p:spPr>
-          <a:xfrm>
-            <a:off x="5983459" y="2152357"/>
-            <a:ext cx="1162929" cy="0"/>
-          </a:xfrm>
-          <a:prstGeom prst="straightConnector1">
-            <a:avLst/>
-          </a:prstGeom>
-          <a:ln w="76200">
-            <a:tailEnd type="triangle"/>
-          </a:ln>
-        </p:spPr>
-        <p:style>
-          <a:lnRef idx="1">
-            <a:schemeClr val="accent1"/>
-          </a:lnRef>
-          <a:fillRef idx="0">
-            <a:schemeClr val="accent1"/>
-          </a:fillRef>
-          <a:effectRef idx="0">
-            <a:schemeClr val="accent1"/>
-          </a:effectRef>
-          <a:fontRef idx="minor">
-            <a:schemeClr val="tx1"/>
-          </a:fontRef>
-        </p:style>
-      </p:cxnSp>
-      <p:cxnSp>
-        <p:nvCxnSpPr>
-          <p:cNvPr id="5" name="Conector recto de flecha 4">
-            <a:extLst>
-              <a:ext uri="{FF2B5EF4-FFF2-40B4-BE49-F238E27FC236}">
-                <a16:creationId xmlns:a16="http://schemas.microsoft.com/office/drawing/2014/main" id="{5D4892AA-3836-4249-9055-D6E974209EB0}"/>
-              </a:ext>
-            </a:extLst>
-          </p:cNvPr>
-          <p:cNvCxnSpPr/>
-          <p:nvPr/>
-        </p:nvCxnSpPr>
-        <p:spPr>
-          <a:xfrm>
-            <a:off x="8834511" y="2152357"/>
-            <a:ext cx="1491175" cy="534572"/>
-          </a:xfrm>
-          <a:prstGeom prst="straightConnector1">
-            <a:avLst/>
-          </a:prstGeom>
-          <a:ln w="76200">
-            <a:solidFill>
-              <a:schemeClr val="accent1"/>
-            </a:solidFill>
-            <a:tailEnd type="triangle"/>
-          </a:ln>
-        </p:spPr>
-        <p:style>
-          <a:lnRef idx="1">
-            <a:schemeClr val="accent1"/>
-          </a:lnRef>
-          <a:fillRef idx="0">
-            <a:schemeClr val="accent1"/>
-          </a:fillRef>
-          <a:effectRef idx="0">
-            <a:schemeClr val="accent1"/>
-          </a:effectRef>
-          <a:fontRef idx="minor">
-            <a:schemeClr val="tx1"/>
-          </a:fontRef>
-        </p:style>
-      </p:cxnSp>
     </p:spTree>
     <p:extLst>
       <p:ext uri="{BB962C8B-B14F-4D97-AF65-F5344CB8AC3E}">
-        <p14:creationId xmlns:p14="http://schemas.microsoft.com/office/powerpoint/2010/main" val="3177889537"/>
+        <p14:creationId xmlns:p14="http://schemas.microsoft.com/office/powerpoint/2010/main" val="2565349215"/>
       </p:ext>
     </p:extLst>
   </p:cSld>
   <p:clrMapOvr>
     <a:masterClrMapping/>
   </p:clrMapOvr>
-  <mc:AlternateContent xmlns:mc="http://schemas.openxmlformats.org/markup-compatibility/2006">
-    <mc:Choice xmlns:p159="http://schemas.microsoft.com/office/powerpoint/2015/09/main" Requires="p159">
+  <mc:AlternateContent xmlns:mc="http://schemas.openxmlformats.org/markup-compatibility/2006" xmlns:p159="http://schemas.microsoft.com/office/powerpoint/2015/09/main">
+    <mc:Choice Requires="p159">
       <p:transition xmlns:p14="http://schemas.microsoft.com/office/powerpoint/2010/main" spd="slow" p14:dur="2000">
         <p159:morph option="byObject"/>
       </p:transition>
     </mc:Choice>
-    <mc:Fallback>
+    <mc:Fallback xmlns="">
       <p:transition spd="slow">
         <p:fade/>
       </p:transition>
@@ -4632,7 +4704,7 @@
         </p:blipFill>
         <p:spPr>
           <a:xfrm>
-            <a:off x="423071" y="590843"/>
+            <a:off x="434360" y="590843"/>
             <a:ext cx="11345858" cy="5219114"/>
           </a:xfrm>
           <a:prstGeom prst="rect">
@@ -4761,107 +4833,23 @@
           </a:fontRef>
         </p:style>
       </p:cxnSp>
-      <p:cxnSp>
-        <p:nvCxnSpPr>
-          <p:cNvPr id="5" name="Conector recto de flecha 4">
-            <a:extLst>
-              <a:ext uri="{FF2B5EF4-FFF2-40B4-BE49-F238E27FC236}">
-                <a16:creationId xmlns:a16="http://schemas.microsoft.com/office/drawing/2014/main" id="{5D4892AA-3836-4249-9055-D6E974209EB0}"/>
-              </a:ext>
-            </a:extLst>
-          </p:cNvPr>
-          <p:cNvCxnSpPr/>
-          <p:nvPr/>
-        </p:nvCxnSpPr>
-        <p:spPr>
-          <a:xfrm>
-            <a:off x="8834511" y="2152357"/>
-            <a:ext cx="1491175" cy="534572"/>
-          </a:xfrm>
-          <a:prstGeom prst="straightConnector1">
-            <a:avLst/>
-          </a:prstGeom>
-          <a:ln w="76200">
-            <a:solidFill>
-              <a:schemeClr val="accent1"/>
-            </a:solidFill>
-            <a:tailEnd type="triangle"/>
-          </a:ln>
-        </p:spPr>
-        <p:style>
-          <a:lnRef idx="1">
-            <a:schemeClr val="accent1"/>
-          </a:lnRef>
-          <a:fillRef idx="0">
-            <a:schemeClr val="accent1"/>
-          </a:fillRef>
-          <a:effectRef idx="0">
-            <a:schemeClr val="accent1"/>
-          </a:effectRef>
-          <a:fontRef idx="minor">
-            <a:schemeClr val="tx1"/>
-          </a:fontRef>
-        </p:style>
-      </p:cxnSp>
-      <p:cxnSp>
-        <p:nvCxnSpPr>
-          <p:cNvPr id="6" name="Conector recto de flecha 5">
-            <a:extLst>
-              <a:ext uri="{FF2B5EF4-FFF2-40B4-BE49-F238E27FC236}">
-                <a16:creationId xmlns:a16="http://schemas.microsoft.com/office/drawing/2014/main" id="{192563FE-6254-4095-AAE0-5269C3C8870F}"/>
-              </a:ext>
-            </a:extLst>
-          </p:cNvPr>
-          <p:cNvCxnSpPr/>
-          <p:nvPr/>
-        </p:nvCxnSpPr>
-        <p:spPr>
-          <a:xfrm flipH="1">
-            <a:off x="8834511" y="3784209"/>
-            <a:ext cx="1589649" cy="379828"/>
-          </a:xfrm>
-          <a:prstGeom prst="straightConnector1">
-            <a:avLst/>
-          </a:prstGeom>
-          <a:ln w="76200">
-            <a:solidFill>
-              <a:schemeClr val="accent1"/>
-            </a:solidFill>
-            <a:tailEnd type="triangle"/>
-          </a:ln>
-        </p:spPr>
-        <p:style>
-          <a:lnRef idx="1">
-            <a:schemeClr val="accent1"/>
-          </a:lnRef>
-          <a:fillRef idx="0">
-            <a:schemeClr val="accent1"/>
-          </a:fillRef>
-          <a:effectRef idx="0">
-            <a:schemeClr val="accent1"/>
-          </a:effectRef>
-          <a:fontRef idx="minor">
-            <a:schemeClr val="tx1"/>
-          </a:fontRef>
-        </p:style>
-      </p:cxnSp>
     </p:spTree>
     <p:extLst>
       <p:ext uri="{BB962C8B-B14F-4D97-AF65-F5344CB8AC3E}">
-        <p14:creationId xmlns:p14="http://schemas.microsoft.com/office/powerpoint/2010/main" val="163781813"/>
+        <p14:creationId xmlns:p14="http://schemas.microsoft.com/office/powerpoint/2010/main" val="29913882"/>
       </p:ext>
     </p:extLst>
   </p:cSld>
   <p:clrMapOvr>
     <a:masterClrMapping/>
   </p:clrMapOvr>
-  <mc:AlternateContent xmlns:mc="http://schemas.openxmlformats.org/markup-compatibility/2006">
-    <mc:Choice xmlns:p159="http://schemas.microsoft.com/office/powerpoint/2015/09/main" Requires="p159">
+  <mc:AlternateContent xmlns:mc="http://schemas.openxmlformats.org/markup-compatibility/2006" xmlns:p159="http://schemas.microsoft.com/office/powerpoint/2015/09/main">
+    <mc:Choice Requires="p159">
       <p:transition xmlns:p14="http://schemas.microsoft.com/office/powerpoint/2010/main" spd="slow" p14:dur="2000">
         <p159:morph option="byObject"/>
       </p:transition>
     </mc:Choice>
-    <mc:Fallback>
+    <mc:Fallback xmlns="">
       <p:transition spd="slow">
         <p:fade/>
       </p:transition>
@@ -5086,109 +5074,23 @@
           </a:fontRef>
         </p:style>
       </p:cxnSp>
-      <p:cxnSp>
-        <p:nvCxnSpPr>
-          <p:cNvPr id="6" name="Conector recto de flecha 5">
-            <a:extLst>
-              <a:ext uri="{FF2B5EF4-FFF2-40B4-BE49-F238E27FC236}">
-                <a16:creationId xmlns:a16="http://schemas.microsoft.com/office/drawing/2014/main" id="{192563FE-6254-4095-AAE0-5269C3C8870F}"/>
-              </a:ext>
-            </a:extLst>
-          </p:cNvPr>
-          <p:cNvCxnSpPr/>
-          <p:nvPr/>
-        </p:nvCxnSpPr>
-        <p:spPr>
-          <a:xfrm flipH="1">
-            <a:off x="8834511" y="3784209"/>
-            <a:ext cx="1589649" cy="379828"/>
-          </a:xfrm>
-          <a:prstGeom prst="straightConnector1">
-            <a:avLst/>
-          </a:prstGeom>
-          <a:ln w="76200">
-            <a:solidFill>
-              <a:schemeClr val="accent1"/>
-            </a:solidFill>
-            <a:tailEnd type="triangle"/>
-          </a:ln>
-        </p:spPr>
-        <p:style>
-          <a:lnRef idx="1">
-            <a:schemeClr val="accent1"/>
-          </a:lnRef>
-          <a:fillRef idx="0">
-            <a:schemeClr val="accent1"/>
-          </a:fillRef>
-          <a:effectRef idx="0">
-            <a:schemeClr val="accent1"/>
-          </a:effectRef>
-          <a:fontRef idx="minor">
-            <a:schemeClr val="tx1"/>
-          </a:fontRef>
-        </p:style>
-      </p:cxnSp>
-      <p:cxnSp>
-        <p:nvCxnSpPr>
-          <p:cNvPr id="7" name="Conector recto de flecha 6">
-            <a:extLst>
-              <a:ext uri="{FF2B5EF4-FFF2-40B4-BE49-F238E27FC236}">
-                <a16:creationId xmlns:a16="http://schemas.microsoft.com/office/drawing/2014/main" id="{B3D05A8C-E8AB-4616-92CB-6A05350CAA14}"/>
-              </a:ext>
-            </a:extLst>
-          </p:cNvPr>
-          <p:cNvCxnSpPr>
-            <a:cxnSpLocks/>
-          </p:cNvCxnSpPr>
-          <p:nvPr/>
-        </p:nvCxnSpPr>
-        <p:spPr>
-          <a:xfrm flipH="1">
-            <a:off x="5641146" y="4164037"/>
-            <a:ext cx="1505242" cy="0"/>
-          </a:xfrm>
-          <a:prstGeom prst="straightConnector1">
-            <a:avLst/>
-          </a:prstGeom>
-          <a:ln w="76200">
-            <a:solidFill>
-              <a:schemeClr val="accent1"/>
-            </a:solidFill>
-            <a:tailEnd type="triangle"/>
-          </a:ln>
-        </p:spPr>
-        <p:style>
-          <a:lnRef idx="1">
-            <a:schemeClr val="accent1"/>
-          </a:lnRef>
-          <a:fillRef idx="0">
-            <a:schemeClr val="accent1"/>
-          </a:fillRef>
-          <a:effectRef idx="0">
-            <a:schemeClr val="accent1"/>
-          </a:effectRef>
-          <a:fontRef idx="minor">
-            <a:schemeClr val="tx1"/>
-          </a:fontRef>
-        </p:style>
-      </p:cxnSp>
     </p:spTree>
     <p:extLst>
       <p:ext uri="{BB962C8B-B14F-4D97-AF65-F5344CB8AC3E}">
-        <p14:creationId xmlns:p14="http://schemas.microsoft.com/office/powerpoint/2010/main" val="2873028928"/>
+        <p14:creationId xmlns:p14="http://schemas.microsoft.com/office/powerpoint/2010/main" val="3177889537"/>
       </p:ext>
     </p:extLst>
   </p:cSld>
   <p:clrMapOvr>
     <a:masterClrMapping/>
   </p:clrMapOvr>
-  <mc:AlternateContent xmlns:mc="http://schemas.openxmlformats.org/markup-compatibility/2006">
-    <mc:Choice xmlns:p159="http://schemas.microsoft.com/office/powerpoint/2015/09/main" Requires="p159">
+  <mc:AlternateContent xmlns:mc="http://schemas.openxmlformats.org/markup-compatibility/2006" xmlns:p159="http://schemas.microsoft.com/office/powerpoint/2015/09/main">
+    <mc:Choice Requires="p159">
       <p:transition xmlns:p14="http://schemas.microsoft.com/office/powerpoint/2010/main" spd="slow" p14:dur="2000">
         <p159:morph option="byObject"/>
       </p:transition>
     </mc:Choice>
-    <mc:Fallback>
+    <mc:Fallback xmlns="">
       <p:transition spd="slow">
         <p:fade/>
       </p:transition>
@@ -5455,6 +5357,289 @@
           </a:fontRef>
         </p:style>
       </p:cxnSp>
+    </p:spTree>
+    <p:extLst>
+      <p:ext uri="{BB962C8B-B14F-4D97-AF65-F5344CB8AC3E}">
+        <p14:creationId xmlns:p14="http://schemas.microsoft.com/office/powerpoint/2010/main" val="163781813"/>
+      </p:ext>
+    </p:extLst>
+  </p:cSld>
+  <p:clrMapOvr>
+    <a:masterClrMapping/>
+  </p:clrMapOvr>
+  <mc:AlternateContent xmlns:mc="http://schemas.openxmlformats.org/markup-compatibility/2006" xmlns:p159="http://schemas.microsoft.com/office/powerpoint/2015/09/main">
+    <mc:Choice Requires="p159">
+      <p:transition xmlns:p14="http://schemas.microsoft.com/office/powerpoint/2010/main" spd="slow" p14:dur="2000">
+        <p159:morph option="byObject"/>
+      </p:transition>
+    </mc:Choice>
+    <mc:Fallback xmlns="">
+      <p:transition spd="slow">
+        <p:fade/>
+      </p:transition>
+    </mc:Fallback>
+  </mc:AlternateContent>
+</p:sld>
+</file>
+
+<file path=ppt/slides/slide9.xml><?xml version="1.0" encoding="utf-8"?>
+<p:sld xmlns:a="http://schemas.openxmlformats.org/drawingml/2006/main" xmlns:r="http://schemas.openxmlformats.org/officeDocument/2006/relationships" xmlns:p="http://schemas.openxmlformats.org/presentationml/2006/main">
+  <p:cSld>
+    <p:spTree>
+      <p:nvGrpSpPr>
+        <p:cNvPr id="1" name=""/>
+        <p:cNvGrpSpPr/>
+        <p:nvPr/>
+      </p:nvGrpSpPr>
+      <p:grpSpPr>
+        <a:xfrm>
+          <a:off x="0" y="0"/>
+          <a:ext cx="0" cy="0"/>
+          <a:chOff x="0" y="0"/>
+          <a:chExt cx="0" cy="0"/>
+        </a:xfrm>
+      </p:grpSpPr>
+      <p:pic>
+        <p:nvPicPr>
+          <p:cNvPr id="9" name="Imagen 8">
+            <a:extLst>
+              <a:ext uri="{FF2B5EF4-FFF2-40B4-BE49-F238E27FC236}">
+                <a16:creationId xmlns:a16="http://schemas.microsoft.com/office/drawing/2014/main" id="{B0851EA8-CC8B-47EF-9F04-A0946FFA1C44}"/>
+              </a:ext>
+            </a:extLst>
+          </p:cNvPr>
+          <p:cNvPicPr>
+            <a:picLocks noChangeAspect="1"/>
+          </p:cNvPicPr>
+          <p:nvPr/>
+        </p:nvPicPr>
+        <p:blipFill>
+          <a:blip r:embed="rId2">
+            <a:extLst>
+              <a:ext uri="{28A0092B-C50C-407E-A947-70E740481C1C}">
+                <a14:useLocalDpi xmlns:a14="http://schemas.microsoft.com/office/drawing/2010/main" val="0"/>
+              </a:ext>
+            </a:extLst>
+          </a:blip>
+          <a:stretch>
+            <a:fillRect/>
+          </a:stretch>
+        </p:blipFill>
+        <p:spPr>
+          <a:xfrm>
+            <a:off x="423071" y="590843"/>
+            <a:ext cx="11345858" cy="5219114"/>
+          </a:xfrm>
+          <a:prstGeom prst="rect">
+            <a:avLst/>
+          </a:prstGeom>
+        </p:spPr>
+      </p:pic>
+      <p:cxnSp>
+        <p:nvCxnSpPr>
+          <p:cNvPr id="14" name="Conector recto de flecha 13">
+            <a:extLst>
+              <a:ext uri="{FF2B5EF4-FFF2-40B4-BE49-F238E27FC236}">
+                <a16:creationId xmlns:a16="http://schemas.microsoft.com/office/drawing/2014/main" id="{5383F0A6-A0AA-4884-BB31-E8231E877D66}"/>
+              </a:ext>
+            </a:extLst>
+          </p:cNvPr>
+          <p:cNvCxnSpPr/>
+          <p:nvPr/>
+        </p:nvCxnSpPr>
+        <p:spPr>
+          <a:xfrm>
+            <a:off x="1688123" y="2982351"/>
+            <a:ext cx="787791" cy="0"/>
+          </a:xfrm>
+          <a:prstGeom prst="straightConnector1">
+            <a:avLst/>
+          </a:prstGeom>
+          <a:ln w="76200">
+            <a:tailEnd type="triangle"/>
+          </a:ln>
+        </p:spPr>
+        <p:style>
+          <a:lnRef idx="1">
+            <a:schemeClr val="accent1"/>
+          </a:lnRef>
+          <a:fillRef idx="0">
+            <a:schemeClr val="accent1"/>
+          </a:fillRef>
+          <a:effectRef idx="0">
+            <a:schemeClr val="accent1"/>
+          </a:effectRef>
+          <a:fontRef idx="minor">
+            <a:schemeClr val="tx1"/>
+          </a:fontRef>
+        </p:style>
+      </p:cxnSp>
+      <p:cxnSp>
+        <p:nvCxnSpPr>
+          <p:cNvPr id="3" name="Conector recto de flecha 2">
+            <a:extLst>
+              <a:ext uri="{FF2B5EF4-FFF2-40B4-BE49-F238E27FC236}">
+                <a16:creationId xmlns:a16="http://schemas.microsoft.com/office/drawing/2014/main" id="{E7DD0955-C0F0-4FF3-8B21-C4522B09365F}"/>
+              </a:ext>
+            </a:extLst>
+          </p:cNvPr>
+          <p:cNvCxnSpPr>
+            <a:cxnSpLocks/>
+          </p:cNvCxnSpPr>
+          <p:nvPr/>
+        </p:nvCxnSpPr>
+        <p:spPr>
+          <a:xfrm flipV="1">
+            <a:off x="3713871" y="2293035"/>
+            <a:ext cx="731520" cy="689316"/>
+          </a:xfrm>
+          <a:prstGeom prst="straightConnector1">
+            <a:avLst/>
+          </a:prstGeom>
+          <a:ln w="76200">
+            <a:tailEnd type="triangle"/>
+          </a:ln>
+        </p:spPr>
+        <p:style>
+          <a:lnRef idx="1">
+            <a:schemeClr val="accent1"/>
+          </a:lnRef>
+          <a:fillRef idx="0">
+            <a:schemeClr val="accent1"/>
+          </a:fillRef>
+          <a:effectRef idx="0">
+            <a:schemeClr val="accent1"/>
+          </a:effectRef>
+          <a:fontRef idx="minor">
+            <a:schemeClr val="tx1"/>
+          </a:fontRef>
+        </p:style>
+      </p:cxnSp>
+      <p:cxnSp>
+        <p:nvCxnSpPr>
+          <p:cNvPr id="4" name="Conector recto de flecha 3">
+            <a:extLst>
+              <a:ext uri="{FF2B5EF4-FFF2-40B4-BE49-F238E27FC236}">
+                <a16:creationId xmlns:a16="http://schemas.microsoft.com/office/drawing/2014/main" id="{B065E748-CB10-496D-A67C-CCAB310768B2}"/>
+              </a:ext>
+            </a:extLst>
+          </p:cNvPr>
+          <p:cNvCxnSpPr>
+            <a:cxnSpLocks/>
+          </p:cNvCxnSpPr>
+          <p:nvPr/>
+        </p:nvCxnSpPr>
+        <p:spPr>
+          <a:xfrm>
+            <a:off x="5983459" y="2152357"/>
+            <a:ext cx="1162929" cy="0"/>
+          </a:xfrm>
+          <a:prstGeom prst="straightConnector1">
+            <a:avLst/>
+          </a:prstGeom>
+          <a:ln w="76200">
+            <a:tailEnd type="triangle"/>
+          </a:ln>
+        </p:spPr>
+        <p:style>
+          <a:lnRef idx="1">
+            <a:schemeClr val="accent1"/>
+          </a:lnRef>
+          <a:fillRef idx="0">
+            <a:schemeClr val="accent1"/>
+          </a:fillRef>
+          <a:effectRef idx="0">
+            <a:schemeClr val="accent1"/>
+          </a:effectRef>
+          <a:fontRef idx="minor">
+            <a:schemeClr val="tx1"/>
+          </a:fontRef>
+        </p:style>
+      </p:cxnSp>
+      <p:cxnSp>
+        <p:nvCxnSpPr>
+          <p:cNvPr id="5" name="Conector recto de flecha 4">
+            <a:extLst>
+              <a:ext uri="{FF2B5EF4-FFF2-40B4-BE49-F238E27FC236}">
+                <a16:creationId xmlns:a16="http://schemas.microsoft.com/office/drawing/2014/main" id="{5D4892AA-3836-4249-9055-D6E974209EB0}"/>
+              </a:ext>
+            </a:extLst>
+          </p:cNvPr>
+          <p:cNvCxnSpPr/>
+          <p:nvPr/>
+        </p:nvCxnSpPr>
+        <p:spPr>
+          <a:xfrm>
+            <a:off x="8834511" y="2152357"/>
+            <a:ext cx="1491175" cy="534572"/>
+          </a:xfrm>
+          <a:prstGeom prst="straightConnector1">
+            <a:avLst/>
+          </a:prstGeom>
+          <a:ln w="76200">
+            <a:solidFill>
+              <a:schemeClr val="accent1"/>
+            </a:solidFill>
+            <a:tailEnd type="triangle"/>
+          </a:ln>
+        </p:spPr>
+        <p:style>
+          <a:lnRef idx="1">
+            <a:schemeClr val="accent1"/>
+          </a:lnRef>
+          <a:fillRef idx="0">
+            <a:schemeClr val="accent1"/>
+          </a:fillRef>
+          <a:effectRef idx="0">
+            <a:schemeClr val="accent1"/>
+          </a:effectRef>
+          <a:fontRef idx="minor">
+            <a:schemeClr val="tx1"/>
+          </a:fontRef>
+        </p:style>
+      </p:cxnSp>
+      <p:cxnSp>
+        <p:nvCxnSpPr>
+          <p:cNvPr id="6" name="Conector recto de flecha 5">
+            <a:extLst>
+              <a:ext uri="{FF2B5EF4-FFF2-40B4-BE49-F238E27FC236}">
+                <a16:creationId xmlns:a16="http://schemas.microsoft.com/office/drawing/2014/main" id="{192563FE-6254-4095-AAE0-5269C3C8870F}"/>
+              </a:ext>
+            </a:extLst>
+          </p:cNvPr>
+          <p:cNvCxnSpPr/>
+          <p:nvPr/>
+        </p:nvCxnSpPr>
+        <p:spPr>
+          <a:xfrm flipH="1">
+            <a:off x="8834511" y="3784209"/>
+            <a:ext cx="1589649" cy="379828"/>
+          </a:xfrm>
+          <a:prstGeom prst="straightConnector1">
+            <a:avLst/>
+          </a:prstGeom>
+          <a:ln w="76200">
+            <a:solidFill>
+              <a:schemeClr val="accent1"/>
+            </a:solidFill>
+            <a:tailEnd type="triangle"/>
+          </a:ln>
+        </p:spPr>
+        <p:style>
+          <a:lnRef idx="1">
+            <a:schemeClr val="accent1"/>
+          </a:lnRef>
+          <a:fillRef idx="0">
+            <a:schemeClr val="accent1"/>
+          </a:fillRef>
+          <a:effectRef idx="0">
+            <a:schemeClr val="accent1"/>
+          </a:effectRef>
+          <a:fontRef idx="minor">
+            <a:schemeClr val="tx1"/>
+          </a:fontRef>
+        </p:style>
+      </p:cxnSp>
       <p:cxnSp>
         <p:nvCxnSpPr>
           <p:cNvPr id="7" name="Conector recto de flecha 6">
@@ -5499,64 +5684,23 @@
           </a:fontRef>
         </p:style>
       </p:cxnSp>
-      <p:cxnSp>
-        <p:nvCxnSpPr>
-          <p:cNvPr id="8" name="Conector recto de flecha 7">
-            <a:extLst>
-              <a:ext uri="{FF2B5EF4-FFF2-40B4-BE49-F238E27FC236}">
-                <a16:creationId xmlns:a16="http://schemas.microsoft.com/office/drawing/2014/main" id="{12B08431-548A-4358-8862-5139E8177FCF}"/>
-              </a:ext>
-            </a:extLst>
-          </p:cNvPr>
-          <p:cNvCxnSpPr>
-            <a:cxnSpLocks/>
-          </p:cNvCxnSpPr>
-          <p:nvPr/>
-        </p:nvCxnSpPr>
-        <p:spPr>
-          <a:xfrm flipH="1" flipV="1">
-            <a:off x="3601329" y="3429000"/>
-            <a:ext cx="844062" cy="931985"/>
-          </a:xfrm>
-          <a:prstGeom prst="straightConnector1">
-            <a:avLst/>
-          </a:prstGeom>
-          <a:ln w="76200">
-            <a:tailEnd type="triangle"/>
-          </a:ln>
-        </p:spPr>
-        <p:style>
-          <a:lnRef idx="1">
-            <a:schemeClr val="accent1"/>
-          </a:lnRef>
-          <a:fillRef idx="0">
-            <a:schemeClr val="accent1"/>
-          </a:fillRef>
-          <a:effectRef idx="0">
-            <a:schemeClr val="accent1"/>
-          </a:effectRef>
-          <a:fontRef idx="minor">
-            <a:schemeClr val="tx1"/>
-          </a:fontRef>
-        </p:style>
-      </p:cxnSp>
     </p:spTree>
     <p:extLst>
       <p:ext uri="{BB962C8B-B14F-4D97-AF65-F5344CB8AC3E}">
-        <p14:creationId xmlns:p14="http://schemas.microsoft.com/office/powerpoint/2010/main" val="3162310616"/>
+        <p14:creationId xmlns:p14="http://schemas.microsoft.com/office/powerpoint/2010/main" val="2873028928"/>
       </p:ext>
     </p:extLst>
   </p:cSld>
   <p:clrMapOvr>
     <a:masterClrMapping/>
   </p:clrMapOvr>
-  <mc:AlternateContent xmlns:mc="http://schemas.openxmlformats.org/markup-compatibility/2006">
-    <mc:Choice xmlns:p159="http://schemas.microsoft.com/office/powerpoint/2015/09/main" Requires="p159">
+  <mc:AlternateContent xmlns:mc="http://schemas.openxmlformats.org/markup-compatibility/2006" xmlns:p159="http://schemas.microsoft.com/office/powerpoint/2015/09/main">
+    <mc:Choice Requires="p159">
       <p:transition xmlns:p14="http://schemas.microsoft.com/office/powerpoint/2010/main" spd="slow" p14:dur="2000">
         <p159:morph option="byObject"/>
       </p:transition>
     </mc:Choice>
-    <mc:Fallback>
+    <mc:Fallback xmlns="">
       <p:transition spd="slow">
         <p:fade/>
       </p:transition>

</xml_diff>